<commit_message>
Adjusting the outline for advanced practices
</commit_message>
<xml_diff>
--- a/04-More Practices.pptx
+++ b/04-More Practices.pptx
@@ -868,7 +868,7 @@
           </a:ln>
           <a:extLst>
             <a:ext uri="{909E8E84-426E-40dd-AFC4-6F175D3DCCD1}">
-              <a14:hiddenFill xmlns:a14="http://schemas.microsoft.com/office/drawing/2010/main" xmlns="">
+              <a14:hiddenFill xmlns="" xmlns:a14="http://schemas.microsoft.com/office/drawing/2010/main">
                 <a:solidFill>
                   <a:srgbClr val="FFFFFF"/>
                 </a:solidFill>
@@ -891,14 +891,14 @@
           <a:noFill/>
           <a:extLst>
             <a:ext uri="{909E8E84-426E-40dd-AFC4-6F175D3DCCD1}">
-              <a14:hiddenFill xmlns:a14="http://schemas.microsoft.com/office/drawing/2010/main" xmlns="">
+              <a14:hiddenFill xmlns="" xmlns:a14="http://schemas.microsoft.com/office/drawing/2010/main">
                 <a:solidFill>
                   <a:srgbClr val="FFFFFF"/>
                 </a:solidFill>
               </a14:hiddenFill>
             </a:ext>
             <a:ext uri="{91240B29-F687-4f45-9708-019B960494DF}">
-              <a14:hiddenLine xmlns:a14="http://schemas.microsoft.com/office/drawing/2010/main" xmlns="" w="9525">
+              <a14:hiddenLine xmlns="" xmlns:a14="http://schemas.microsoft.com/office/drawing/2010/main" w="9525">
                 <a:solidFill>
                   <a:srgbClr val="000000"/>
                 </a:solidFill>
@@ -936,14 +936,14 @@
           <a:noFill/>
           <a:extLst>
             <a:ext uri="{909E8E84-426E-40dd-AFC4-6F175D3DCCD1}">
-              <a14:hiddenFill xmlns:a14="http://schemas.microsoft.com/office/drawing/2010/main" xmlns="">
+              <a14:hiddenFill xmlns="" xmlns:a14="http://schemas.microsoft.com/office/drawing/2010/main">
                 <a:solidFill>
                   <a:srgbClr val="FFFFFF"/>
                 </a:solidFill>
               </a14:hiddenFill>
             </a:ext>
             <a:ext uri="{91240B29-F687-4f45-9708-019B960494DF}">
-              <a14:hiddenLine xmlns:a14="http://schemas.microsoft.com/office/drawing/2010/main" xmlns="" w="9525">
+              <a14:hiddenLine xmlns="" xmlns:a14="http://schemas.microsoft.com/office/drawing/2010/main" w="9525">
                 <a:solidFill>
                   <a:srgbClr val="000000"/>
                 </a:solidFill>
@@ -1809,7 +1809,7 @@
           </a:ln>
           <a:extLst>
             <a:ext uri="{909E8E84-426E-40dd-AFC4-6F175D3DCCD1}">
-              <a14:hiddenFill xmlns:a14="http://schemas.microsoft.com/office/drawing/2010/main" xmlns="">
+              <a14:hiddenFill xmlns="" xmlns:a14="http://schemas.microsoft.com/office/drawing/2010/main">
                 <a:solidFill>
                   <a:srgbClr val="FFFFFF"/>
                 </a:solidFill>
@@ -1832,14 +1832,14 @@
           <a:noFill/>
           <a:extLst>
             <a:ext uri="{909E8E84-426E-40dd-AFC4-6F175D3DCCD1}">
-              <a14:hiddenFill xmlns:a14="http://schemas.microsoft.com/office/drawing/2010/main" xmlns="">
+              <a14:hiddenFill xmlns="" xmlns:a14="http://schemas.microsoft.com/office/drawing/2010/main">
                 <a:solidFill>
                   <a:srgbClr val="FFFFFF"/>
                 </a:solidFill>
               </a14:hiddenFill>
             </a:ext>
             <a:ext uri="{91240B29-F687-4f45-9708-019B960494DF}">
-              <a14:hiddenLine xmlns:a14="http://schemas.microsoft.com/office/drawing/2010/main" xmlns="" w="9525">
+              <a14:hiddenLine xmlns="" xmlns:a14="http://schemas.microsoft.com/office/drawing/2010/main" w="9525">
                 <a:solidFill>
                   <a:srgbClr val="000000"/>
                 </a:solidFill>
@@ -1877,14 +1877,14 @@
           <a:noFill/>
           <a:extLst>
             <a:ext uri="{909E8E84-426E-40dd-AFC4-6F175D3DCCD1}">
-              <a14:hiddenFill xmlns:a14="http://schemas.microsoft.com/office/drawing/2010/main" xmlns="">
+              <a14:hiddenFill xmlns="" xmlns:a14="http://schemas.microsoft.com/office/drawing/2010/main">
                 <a:solidFill>
                   <a:srgbClr val="FFFFFF"/>
                 </a:solidFill>
               </a14:hiddenFill>
             </a:ext>
             <a:ext uri="{91240B29-F687-4f45-9708-019B960494DF}">
-              <a14:hiddenLine xmlns:a14="http://schemas.microsoft.com/office/drawing/2010/main" xmlns="" w="9525">
+              <a14:hiddenLine xmlns="" xmlns:a14="http://schemas.microsoft.com/office/drawing/2010/main" w="9525">
                 <a:solidFill>
                   <a:srgbClr val="000000"/>
                 </a:solidFill>
@@ -6607,12 +6607,29 @@
             </a:r>
           </a:p>
           <a:p>
+            <a:r>
+              <a:rPr lang="en-US" sz="2400" dirty="0" smtClean="0">
+                <a:latin typeface="News Gothic Com Thin" charset="0"/>
+              </a:rPr>
+              <a:t>Dependency Inversion</a:t>
+            </a:r>
+          </a:p>
+          <a:p>
             <a:pPr lvl="1"/>
             <a:r>
               <a:rPr lang="en-US" sz="2000" dirty="0" smtClean="0">
                 <a:latin typeface="News Gothic Com Thin" charset="0"/>
               </a:rPr>
-              <a:t>Test interactions with dependencies</a:t>
+              <a:t>Injection</a:t>
+            </a:r>
+          </a:p>
+          <a:p>
+            <a:pPr lvl="1"/>
+            <a:r>
+              <a:rPr lang="en-US" sz="2000" dirty="0" smtClean="0">
+                <a:latin typeface="News Gothic Com Thin" charset="0"/>
+              </a:rPr>
+              <a:t>Onion Architecture</a:t>
             </a:r>
             <a:endParaRPr lang="en-US" sz="2000" dirty="0">
               <a:latin typeface="News Gothic Com Thin" charset="0"/>
@@ -6712,15 +6729,33 @@
                                   </p:childTnLst>
                                 </p:cTn>
                               </p:par>
+                            </p:childTnLst>
+                          </p:cTn>
+                        </p:par>
+                      </p:childTnLst>
+                    </p:cTn>
+                  </p:par>
+                  <p:par>
+                    <p:cTn id="8" fill="hold">
+                      <p:stCondLst>
+                        <p:cond delay="indefinite"/>
+                      </p:stCondLst>
+                      <p:childTnLst>
+                        <p:par>
+                          <p:cTn id="9" fill="hold">
+                            <p:stCondLst>
+                              <p:cond delay="0"/>
+                            </p:stCondLst>
+                            <p:childTnLst>
                               <p:par>
-                                <p:cTn id="8" presetID="10" presetClass="entr" presetSubtype="0" fill="hold" grpId="0" nodeType="withEffect">
+                                <p:cTn id="10" presetID="10" presetClass="entr" presetSubtype="0" fill="hold" grpId="0" nodeType="clickEffect">
                                   <p:stCondLst>
                                     <p:cond delay="0"/>
                                   </p:stCondLst>
                                   <p:childTnLst>
                                     <p:set>
                                       <p:cBhvr>
-                                        <p:cTn id="9" dur="1" fill="hold">
+                                        <p:cTn id="11" dur="1" fill="hold">
                                           <p:stCondLst>
                                             <p:cond delay="0"/>
                                           </p:stCondLst>
@@ -6742,7 +6777,7 @@
                                     </p:set>
                                     <p:animEffect transition="in" filter="fade">
                                       <p:cBhvr>
-                                        <p:cTn id="10" dur="500"/>
+                                        <p:cTn id="12" dur="500"/>
                                         <p:tgtEl>
                                           <p:spTgt spid="6146">
                                             <p:txEl>
@@ -6755,15 +6790,33 @@
                                   </p:childTnLst>
                                 </p:cTn>
                               </p:par>
+                            </p:childTnLst>
+                          </p:cTn>
+                        </p:par>
+                      </p:childTnLst>
+                    </p:cTn>
+                  </p:par>
+                  <p:par>
+                    <p:cTn id="13" fill="hold">
+                      <p:stCondLst>
+                        <p:cond delay="indefinite"/>
+                      </p:stCondLst>
+                      <p:childTnLst>
+                        <p:par>
+                          <p:cTn id="14" fill="hold">
+                            <p:stCondLst>
+                              <p:cond delay="0"/>
+                            </p:stCondLst>
+                            <p:childTnLst>
                               <p:par>
-                                <p:cTn id="11" presetID="10" presetClass="entr" presetSubtype="0" fill="hold" grpId="0" nodeType="withEffect">
+                                <p:cTn id="15" presetID="10" presetClass="entr" presetSubtype="0" fill="hold" grpId="0" nodeType="clickEffect">
                                   <p:stCondLst>
                                     <p:cond delay="0"/>
                                   </p:stCondLst>
                                   <p:childTnLst>
                                     <p:set>
                                       <p:cBhvr>
-                                        <p:cTn id="12" dur="1" fill="hold">
+                                        <p:cTn id="16" dur="1" fill="hold">
                                           <p:stCondLst>
                                             <p:cond delay="0"/>
                                           </p:stCondLst>
@@ -6785,7 +6838,7 @@
                                     </p:set>
                                     <p:animEffect transition="in" filter="fade">
                                       <p:cBhvr>
-                                        <p:cTn id="13" dur="500"/>
+                                        <p:cTn id="17" dur="500"/>
                                         <p:tgtEl>
                                           <p:spTgt spid="6146">
                                             <p:txEl>
@@ -6798,15 +6851,33 @@
                                   </p:childTnLst>
                                 </p:cTn>
                               </p:par>
+                            </p:childTnLst>
+                          </p:cTn>
+                        </p:par>
+                      </p:childTnLst>
+                    </p:cTn>
+                  </p:par>
+                  <p:par>
+                    <p:cTn id="18" fill="hold">
+                      <p:stCondLst>
+                        <p:cond delay="indefinite"/>
+                      </p:stCondLst>
+                      <p:childTnLst>
+                        <p:par>
+                          <p:cTn id="19" fill="hold">
+                            <p:stCondLst>
+                              <p:cond delay="0"/>
+                            </p:stCondLst>
+                            <p:childTnLst>
                               <p:par>
-                                <p:cTn id="14" presetID="10" presetClass="entr" presetSubtype="0" fill="hold" grpId="0" nodeType="withEffect">
+                                <p:cTn id="20" presetID="10" presetClass="entr" presetSubtype="0" fill="hold" grpId="0" nodeType="clickEffect">
                                   <p:stCondLst>
                                     <p:cond delay="0"/>
                                   </p:stCondLst>
                                   <p:childTnLst>
                                     <p:set>
                                       <p:cBhvr>
-                                        <p:cTn id="15" dur="1" fill="hold">
+                                        <p:cTn id="21" dur="1" fill="hold">
                                           <p:stCondLst>
                                             <p:cond delay="0"/>
                                           </p:stCondLst>
@@ -6828,11 +6899,133 @@
                                     </p:set>
                                     <p:animEffect transition="in" filter="fade">
                                       <p:cBhvr>
-                                        <p:cTn id="16" dur="500"/>
+                                        <p:cTn id="22" dur="500"/>
                                         <p:tgtEl>
                                           <p:spTgt spid="6146">
                                             <p:txEl>
                                               <p:pRg st="3" end="3"/>
+                                            </p:txEl>
+                                          </p:spTgt>
+                                        </p:tgtEl>
+                                      </p:cBhvr>
+                                    </p:animEffect>
+                                  </p:childTnLst>
+                                </p:cTn>
+                              </p:par>
+                            </p:childTnLst>
+                          </p:cTn>
+                        </p:par>
+                      </p:childTnLst>
+                    </p:cTn>
+                  </p:par>
+                  <p:par>
+                    <p:cTn id="23" fill="hold">
+                      <p:stCondLst>
+                        <p:cond delay="indefinite"/>
+                      </p:stCondLst>
+                      <p:childTnLst>
+                        <p:par>
+                          <p:cTn id="24" fill="hold">
+                            <p:stCondLst>
+                              <p:cond delay="0"/>
+                            </p:stCondLst>
+                            <p:childTnLst>
+                              <p:par>
+                                <p:cTn id="25" presetID="10" presetClass="entr" presetSubtype="0" fill="hold" grpId="0" nodeType="clickEffect">
+                                  <p:stCondLst>
+                                    <p:cond delay="0"/>
+                                  </p:stCondLst>
+                                  <p:childTnLst>
+                                    <p:set>
+                                      <p:cBhvr>
+                                        <p:cTn id="26" dur="1" fill="hold">
+                                          <p:stCondLst>
+                                            <p:cond delay="0"/>
+                                          </p:stCondLst>
+                                        </p:cTn>
+                                        <p:tgtEl>
+                                          <p:spTgt spid="6146">
+                                            <p:txEl>
+                                              <p:pRg st="4" end="4"/>
+                                            </p:txEl>
+                                          </p:spTgt>
+                                        </p:tgtEl>
+                                        <p:attrNameLst>
+                                          <p:attrName>style.visibility</p:attrName>
+                                        </p:attrNameLst>
+                                      </p:cBhvr>
+                                      <p:to>
+                                        <p:strVal val="visible"/>
+                                      </p:to>
+                                    </p:set>
+                                    <p:animEffect transition="in" filter="fade">
+                                      <p:cBhvr>
+                                        <p:cTn id="27" dur="500"/>
+                                        <p:tgtEl>
+                                          <p:spTgt spid="6146">
+                                            <p:txEl>
+                                              <p:pRg st="4" end="4"/>
+                                            </p:txEl>
+                                          </p:spTgt>
+                                        </p:tgtEl>
+                                      </p:cBhvr>
+                                    </p:animEffect>
+                                  </p:childTnLst>
+                                </p:cTn>
+                              </p:par>
+                            </p:childTnLst>
+                          </p:cTn>
+                        </p:par>
+                      </p:childTnLst>
+                    </p:cTn>
+                  </p:par>
+                  <p:par>
+                    <p:cTn id="28" fill="hold">
+                      <p:stCondLst>
+                        <p:cond delay="indefinite"/>
+                      </p:stCondLst>
+                      <p:childTnLst>
+                        <p:par>
+                          <p:cTn id="29" fill="hold">
+                            <p:stCondLst>
+                              <p:cond delay="0"/>
+                            </p:stCondLst>
+                            <p:childTnLst>
+                              <p:par>
+                                <p:cTn id="30" presetID="10" presetClass="entr" presetSubtype="0" fill="hold" grpId="0" nodeType="clickEffect">
+                                  <p:stCondLst>
+                                    <p:cond delay="0"/>
+                                  </p:stCondLst>
+                                  <p:childTnLst>
+                                    <p:set>
+                                      <p:cBhvr>
+                                        <p:cTn id="31" dur="1" fill="hold">
+                                          <p:stCondLst>
+                                            <p:cond delay="0"/>
+                                          </p:stCondLst>
+                                        </p:cTn>
+                                        <p:tgtEl>
+                                          <p:spTgt spid="6146">
+                                            <p:txEl>
+                                              <p:pRg st="5" end="5"/>
+                                            </p:txEl>
+                                          </p:spTgt>
+                                        </p:tgtEl>
+                                        <p:attrNameLst>
+                                          <p:attrName>style.visibility</p:attrName>
+                                        </p:attrNameLst>
+                                      </p:cBhvr>
+                                      <p:to>
+                                        <p:strVal val="visible"/>
+                                      </p:to>
+                                    </p:set>
+                                    <p:animEffect transition="in" filter="fade">
+                                      <p:cBhvr>
+                                        <p:cTn id="32" dur="500"/>
+                                        <p:tgtEl>
+                                          <p:spTgt spid="6146">
+                                            <p:txEl>
+                                              <p:pRg st="5" end="5"/>
                                             </p:txEl>
                                           </p:spTgt>
                                         </p:tgtEl>
@@ -6869,7 +7062,7 @@
       </p:par>
     </p:tnLst>
     <p:bldLst>
-      <p:bldP spid="6146" grpId="0" build="p"/>
+      <p:bldP spid="6146" grpId="0" uiExpand="1" build="p"/>
     </p:bldLst>
   </p:timing>
 </p:sld>
@@ -7560,14 +7753,14 @@
           </a:ln>
           <a:extLst>
             <a:ext uri="{909E8E84-426E-40dd-AFC4-6F175D3DCCD1}">
-              <a14:hiddenFill xmlns:a14="http://schemas.microsoft.com/office/drawing/2010/main" xmlns="">
+              <a14:hiddenFill xmlns="" xmlns:a14="http://schemas.microsoft.com/office/drawing/2010/main">
                 <a:solidFill>
                   <a:srgbClr val="FFFFFF"/>
                 </a:solidFill>
               </a14:hiddenFill>
             </a:ext>
             <a:ext uri="{91240B29-F687-4f45-9708-019B960494DF}">
-              <a14:hiddenLine xmlns:a14="http://schemas.microsoft.com/office/drawing/2010/main" xmlns="" w="9525">
+              <a14:hiddenLine xmlns="" xmlns:a14="http://schemas.microsoft.com/office/drawing/2010/main" w="9525">
                 <a:solidFill>
                   <a:srgbClr val="000000"/>
                 </a:solidFill>

</xml_diff>

<commit_message>
Cleaning up Advanced Practices
</commit_message>
<xml_diff>
--- a/04-More Practices.pptx
+++ b/04-More Practices.pptx
@@ -868,7 +868,7 @@
           </a:ln>
           <a:extLst>
             <a:ext uri="{909E8E84-426E-40dd-AFC4-6F175D3DCCD1}">
-              <a14:hiddenFill xmlns="" xmlns:a14="http://schemas.microsoft.com/office/drawing/2010/main">
+              <a14:hiddenFill xmlns:a14="http://schemas.microsoft.com/office/drawing/2010/main" xmlns="">
                 <a:solidFill>
                   <a:srgbClr val="FFFFFF"/>
                 </a:solidFill>
@@ -891,14 +891,14 @@
           <a:noFill/>
           <a:extLst>
             <a:ext uri="{909E8E84-426E-40dd-AFC4-6F175D3DCCD1}">
-              <a14:hiddenFill xmlns="" xmlns:a14="http://schemas.microsoft.com/office/drawing/2010/main">
+              <a14:hiddenFill xmlns:a14="http://schemas.microsoft.com/office/drawing/2010/main" xmlns="">
                 <a:solidFill>
                   <a:srgbClr val="FFFFFF"/>
                 </a:solidFill>
               </a14:hiddenFill>
             </a:ext>
             <a:ext uri="{91240B29-F687-4f45-9708-019B960494DF}">
-              <a14:hiddenLine xmlns="" xmlns:a14="http://schemas.microsoft.com/office/drawing/2010/main" w="9525">
+              <a14:hiddenLine xmlns:a14="http://schemas.microsoft.com/office/drawing/2010/main" xmlns="" w="9525">
                 <a:solidFill>
                   <a:srgbClr val="000000"/>
                 </a:solidFill>
@@ -936,14 +936,14 @@
           <a:noFill/>
           <a:extLst>
             <a:ext uri="{909E8E84-426E-40dd-AFC4-6F175D3DCCD1}">
-              <a14:hiddenFill xmlns="" xmlns:a14="http://schemas.microsoft.com/office/drawing/2010/main">
+              <a14:hiddenFill xmlns:a14="http://schemas.microsoft.com/office/drawing/2010/main" xmlns="">
                 <a:solidFill>
                   <a:srgbClr val="FFFFFF"/>
                 </a:solidFill>
               </a14:hiddenFill>
             </a:ext>
             <a:ext uri="{91240B29-F687-4f45-9708-019B960494DF}">
-              <a14:hiddenLine xmlns="" xmlns:a14="http://schemas.microsoft.com/office/drawing/2010/main" w="9525">
+              <a14:hiddenLine xmlns:a14="http://schemas.microsoft.com/office/drawing/2010/main" xmlns="" w="9525">
                 <a:solidFill>
                   <a:srgbClr val="000000"/>
                 </a:solidFill>
@@ -1809,7 +1809,7 @@
           </a:ln>
           <a:extLst>
             <a:ext uri="{909E8E84-426E-40dd-AFC4-6F175D3DCCD1}">
-              <a14:hiddenFill xmlns="" xmlns:a14="http://schemas.microsoft.com/office/drawing/2010/main">
+              <a14:hiddenFill xmlns:a14="http://schemas.microsoft.com/office/drawing/2010/main" xmlns="">
                 <a:solidFill>
                   <a:srgbClr val="FFFFFF"/>
                 </a:solidFill>
@@ -1832,14 +1832,14 @@
           <a:noFill/>
           <a:extLst>
             <a:ext uri="{909E8E84-426E-40dd-AFC4-6F175D3DCCD1}">
-              <a14:hiddenFill xmlns="" xmlns:a14="http://schemas.microsoft.com/office/drawing/2010/main">
+              <a14:hiddenFill xmlns:a14="http://schemas.microsoft.com/office/drawing/2010/main" xmlns="">
                 <a:solidFill>
                   <a:srgbClr val="FFFFFF"/>
                 </a:solidFill>
               </a14:hiddenFill>
             </a:ext>
             <a:ext uri="{91240B29-F687-4f45-9708-019B960494DF}">
-              <a14:hiddenLine xmlns="" xmlns:a14="http://schemas.microsoft.com/office/drawing/2010/main" w="9525">
+              <a14:hiddenLine xmlns:a14="http://schemas.microsoft.com/office/drawing/2010/main" xmlns="" w="9525">
                 <a:solidFill>
                   <a:srgbClr val="000000"/>
                 </a:solidFill>
@@ -1877,14 +1877,14 @@
           <a:noFill/>
           <a:extLst>
             <a:ext uri="{909E8E84-426E-40dd-AFC4-6F175D3DCCD1}">
-              <a14:hiddenFill xmlns="" xmlns:a14="http://schemas.microsoft.com/office/drawing/2010/main">
+              <a14:hiddenFill xmlns:a14="http://schemas.microsoft.com/office/drawing/2010/main" xmlns="">
                 <a:solidFill>
                   <a:srgbClr val="FFFFFF"/>
                 </a:solidFill>
               </a14:hiddenFill>
             </a:ext>
             <a:ext uri="{91240B29-F687-4f45-9708-019B960494DF}">
-              <a14:hiddenLine xmlns="" xmlns:a14="http://schemas.microsoft.com/office/drawing/2010/main" w="9525">
+              <a14:hiddenLine xmlns:a14="http://schemas.microsoft.com/office/drawing/2010/main" xmlns="" w="9525">
                 <a:solidFill>
                   <a:srgbClr val="000000"/>
                 </a:solidFill>
@@ -7713,6 +7713,9 @@
           <a:bodyPr/>
           <a:lstStyle/>
           <a:p>
+            <a:pPr marL="0" indent="0">
+              <a:buNone/>
+            </a:pPr>
             <a:r>
               <a:rPr lang="en-US" sz="2400" dirty="0" smtClean="0">
                 <a:latin typeface="News Gothic Com Thin" charset="0"/>
@@ -7741,7 +7744,7 @@
         </p:blipFill>
         <p:spPr bwMode="auto">
           <a:xfrm>
-            <a:off x="1219200" y="1737360"/>
+            <a:off x="1219200" y="1959786"/>
             <a:ext cx="6705600" cy="2666343"/>
           </a:xfrm>
           <a:prstGeom prst="rect">
@@ -7753,14 +7756,14 @@
           </a:ln>
           <a:extLst>
             <a:ext uri="{909E8E84-426E-40dd-AFC4-6F175D3DCCD1}">
-              <a14:hiddenFill xmlns="" xmlns:a14="http://schemas.microsoft.com/office/drawing/2010/main">
+              <a14:hiddenFill xmlns:a14="http://schemas.microsoft.com/office/drawing/2010/main" xmlns="">
                 <a:solidFill>
                   <a:srgbClr val="FFFFFF"/>
                 </a:solidFill>
               </a14:hiddenFill>
             </a:ext>
             <a:ext uri="{91240B29-F687-4f45-9708-019B960494DF}">
-              <a14:hiddenLine xmlns="" xmlns:a14="http://schemas.microsoft.com/office/drawing/2010/main" w="9525">
+              <a14:hiddenLine xmlns:a14="http://schemas.microsoft.com/office/drawing/2010/main" xmlns="" w="9525">
                 <a:solidFill>
                   <a:srgbClr val="000000"/>
                 </a:solidFill>
@@ -7925,25 +7928,6 @@
             <a:endParaRPr lang="en-US" dirty="0">
               <a:latin typeface="News Gothic Com Thin" charset="0"/>
             </a:endParaRPr>
-          </a:p>
-        </p:txBody>
-      </p:sp>
-      <p:sp>
-        <p:nvSpPr>
-          <p:cNvPr id="2" name="Content Placeholder 1"/>
-          <p:cNvSpPr>
-            <a:spLocks noGrp="1"/>
-          </p:cNvSpPr>
-          <p:nvPr>
-            <p:ph idx="1"/>
-          </p:nvPr>
-        </p:nvSpPr>
-        <p:spPr/>
-        <p:txBody>
-          <a:bodyPr/>
-          <a:lstStyle/>
-          <a:p>
-            <a:endParaRPr lang="en-US"/>
           </a:p>
         </p:txBody>
       </p:sp>

</xml_diff>

<commit_message>
More Clean up of Advanced Practices
</commit_message>
<xml_diff>
--- a/04-More Practices.pptx
+++ b/04-More Practices.pptx
@@ -868,7 +868,7 @@
           </a:ln>
           <a:extLst>
             <a:ext uri="{909E8E84-426E-40dd-AFC4-6F175D3DCCD1}">
-              <a14:hiddenFill xmlns:a14="http://schemas.microsoft.com/office/drawing/2010/main" xmlns="">
+              <a14:hiddenFill xmlns="" xmlns:a14="http://schemas.microsoft.com/office/drawing/2010/main">
                 <a:solidFill>
                   <a:srgbClr val="FFFFFF"/>
                 </a:solidFill>
@@ -891,14 +891,14 @@
           <a:noFill/>
           <a:extLst>
             <a:ext uri="{909E8E84-426E-40dd-AFC4-6F175D3DCCD1}">
-              <a14:hiddenFill xmlns:a14="http://schemas.microsoft.com/office/drawing/2010/main" xmlns="">
+              <a14:hiddenFill xmlns="" xmlns:a14="http://schemas.microsoft.com/office/drawing/2010/main">
                 <a:solidFill>
                   <a:srgbClr val="FFFFFF"/>
                 </a:solidFill>
               </a14:hiddenFill>
             </a:ext>
             <a:ext uri="{91240B29-F687-4f45-9708-019B960494DF}">
-              <a14:hiddenLine xmlns:a14="http://schemas.microsoft.com/office/drawing/2010/main" xmlns="" w="9525">
+              <a14:hiddenLine xmlns="" xmlns:a14="http://schemas.microsoft.com/office/drawing/2010/main" w="9525">
                 <a:solidFill>
                   <a:srgbClr val="000000"/>
                 </a:solidFill>
@@ -936,14 +936,14 @@
           <a:noFill/>
           <a:extLst>
             <a:ext uri="{909E8E84-426E-40dd-AFC4-6F175D3DCCD1}">
-              <a14:hiddenFill xmlns:a14="http://schemas.microsoft.com/office/drawing/2010/main" xmlns="">
+              <a14:hiddenFill xmlns="" xmlns:a14="http://schemas.microsoft.com/office/drawing/2010/main">
                 <a:solidFill>
                   <a:srgbClr val="FFFFFF"/>
                 </a:solidFill>
               </a14:hiddenFill>
             </a:ext>
             <a:ext uri="{91240B29-F687-4f45-9708-019B960494DF}">
-              <a14:hiddenLine xmlns:a14="http://schemas.microsoft.com/office/drawing/2010/main" xmlns="" w="9525">
+              <a14:hiddenLine xmlns="" xmlns:a14="http://schemas.microsoft.com/office/drawing/2010/main" w="9525">
                 <a:solidFill>
                   <a:srgbClr val="000000"/>
                 </a:solidFill>
@@ -1809,7 +1809,7 @@
           </a:ln>
           <a:extLst>
             <a:ext uri="{909E8E84-426E-40dd-AFC4-6F175D3DCCD1}">
-              <a14:hiddenFill xmlns:a14="http://schemas.microsoft.com/office/drawing/2010/main" xmlns="">
+              <a14:hiddenFill xmlns="" xmlns:a14="http://schemas.microsoft.com/office/drawing/2010/main">
                 <a:solidFill>
                   <a:srgbClr val="FFFFFF"/>
                 </a:solidFill>
@@ -1832,14 +1832,14 @@
           <a:noFill/>
           <a:extLst>
             <a:ext uri="{909E8E84-426E-40dd-AFC4-6F175D3DCCD1}">
-              <a14:hiddenFill xmlns:a14="http://schemas.microsoft.com/office/drawing/2010/main" xmlns="">
+              <a14:hiddenFill xmlns="" xmlns:a14="http://schemas.microsoft.com/office/drawing/2010/main">
                 <a:solidFill>
                   <a:srgbClr val="FFFFFF"/>
                 </a:solidFill>
               </a14:hiddenFill>
             </a:ext>
             <a:ext uri="{91240B29-F687-4f45-9708-019B960494DF}">
-              <a14:hiddenLine xmlns:a14="http://schemas.microsoft.com/office/drawing/2010/main" xmlns="" w="9525">
+              <a14:hiddenLine xmlns="" xmlns:a14="http://schemas.microsoft.com/office/drawing/2010/main" w="9525">
                 <a:solidFill>
                   <a:srgbClr val="000000"/>
                 </a:solidFill>
@@ -1877,14 +1877,14 @@
           <a:noFill/>
           <a:extLst>
             <a:ext uri="{909E8E84-426E-40dd-AFC4-6F175D3DCCD1}">
-              <a14:hiddenFill xmlns:a14="http://schemas.microsoft.com/office/drawing/2010/main" xmlns="">
+              <a14:hiddenFill xmlns="" xmlns:a14="http://schemas.microsoft.com/office/drawing/2010/main">
                 <a:solidFill>
                   <a:srgbClr val="FFFFFF"/>
                 </a:solidFill>
               </a14:hiddenFill>
             </a:ext>
             <a:ext uri="{91240B29-F687-4f45-9708-019B960494DF}">
-              <a14:hiddenLine xmlns:a14="http://schemas.microsoft.com/office/drawing/2010/main" xmlns="" w="9525">
+              <a14:hiddenLine xmlns="" xmlns:a14="http://schemas.microsoft.com/office/drawing/2010/main" w="9525">
                 <a:solidFill>
                   <a:srgbClr val="000000"/>
                 </a:solidFill>
@@ -7756,14 +7756,14 @@
           </a:ln>
           <a:extLst>
             <a:ext uri="{909E8E84-426E-40dd-AFC4-6F175D3DCCD1}">
-              <a14:hiddenFill xmlns:a14="http://schemas.microsoft.com/office/drawing/2010/main" xmlns="">
+              <a14:hiddenFill xmlns="" xmlns:a14="http://schemas.microsoft.com/office/drawing/2010/main">
                 <a:solidFill>
                   <a:srgbClr val="FFFFFF"/>
                 </a:solidFill>
               </a14:hiddenFill>
             </a:ext>
             <a:ext uri="{91240B29-F687-4f45-9708-019B960494DF}">
-              <a14:hiddenLine xmlns:a14="http://schemas.microsoft.com/office/drawing/2010/main" xmlns="" w="9525">
+              <a14:hiddenLine xmlns="" xmlns:a14="http://schemas.microsoft.com/office/drawing/2010/main" w="9525">
                 <a:solidFill>
                   <a:srgbClr val="000000"/>
                 </a:solidFill>
@@ -8854,7 +8854,15 @@
           <a:p>
             <a:r>
               <a:rPr lang="en-US" dirty="0" smtClean="0"/>
-              <a:t>Constructor Injection (preferred)</a:t>
+              <a:t>Constructor Injection </a:t>
+            </a:r>
+            <a:r>
+              <a:rPr lang="en-US" dirty="0" smtClean="0"/>
+              <a:t>(my preferred</a:t>
+            </a:r>
+            <a:r>
+              <a:rPr lang="en-US" dirty="0" smtClean="0"/>
+              <a:t>)</a:t>
             </a:r>
           </a:p>
           <a:p>

</xml_diff>